<commit_message>
Fixed powerpoint gg peter 2 scummy
</commit_message>
<xml_diff>
--- a/Sprint1/Presentation Report 1.pptx
+++ b/Sprint1/Presentation Report 1.pptx
@@ -3202,7 +3202,25 @@
                 </a:solidFill>
                 <a:latin typeface="+mj-lt"/>
               </a:rPr>
-              <a:t>, Peter Truong, and Efren Aguilar</a:t>
+              <a:t>, Peter Truong, </a:t>
+            </a:r>
+            <a:r>
+              <a:rPr lang="en-US" dirty="0" smtClean="0">
+                <a:solidFill>
+                  <a:schemeClr val="bg1"/>
+                </a:solidFill>
+                <a:latin typeface="+mj-lt"/>
+              </a:rPr>
+              <a:t>Efren Aguilar, and Alex </a:t>
+            </a:r>
+            <a:r>
+              <a:rPr lang="en-US" smtClean="0">
+                <a:solidFill>
+                  <a:schemeClr val="bg1"/>
+                </a:solidFill>
+                <a:latin typeface="+mj-lt"/>
+              </a:rPr>
+              <a:t>Deuling</a:t>
             </a:r>
             <a:endParaRPr lang="en-US" dirty="0">
               <a:solidFill>
@@ -3390,11 +3408,6 @@
               </a:rPr>
               <a:t>person standing.</a:t>
             </a:r>
-            <a:endParaRPr lang="en-US" sz="2100" dirty="0" smtClean="0">
-              <a:solidFill>
-                <a:schemeClr val="bg1"/>
-              </a:solidFill>
-            </a:endParaRPr>
           </a:p>
           <a:p>
             <a:r>
@@ -3403,23 +3416,7 @@
                   <a:schemeClr val="bg1"/>
                 </a:solidFill>
               </a:rPr>
-              <a:t>Four </a:t>
-            </a:r>
-            <a:r>
-              <a:rPr lang="en-US" sz="2100" dirty="0" smtClean="0">
-                <a:solidFill>
-                  <a:schemeClr val="bg1"/>
-                </a:solidFill>
-              </a:rPr>
-              <a:t>power </a:t>
-            </a:r>
-            <a:r>
-              <a:rPr lang="en-US" sz="2100" dirty="0" smtClean="0">
-                <a:solidFill>
-                  <a:schemeClr val="bg1"/>
-                </a:solidFill>
-              </a:rPr>
-              <a:t>ups</a:t>
+              <a:t>Four power ups</a:t>
             </a:r>
           </a:p>
           <a:p>
@@ -3432,11 +3429,6 @@
               </a:rPr>
               <a:t>Speed Up (Lightning Bolt)</a:t>
             </a:r>
-            <a:endParaRPr lang="en-US" sz="2100" dirty="0" smtClean="0">
-              <a:solidFill>
-                <a:schemeClr val="bg1"/>
-              </a:solidFill>
-            </a:endParaRPr>
           </a:p>
           <a:p>
             <a:pPr lvl="1"/>
@@ -3459,11 +3451,6 @@
               </a:rPr>
               <a:t>Explosion Size (Green +1)</a:t>
             </a:r>
-            <a:endParaRPr lang="en-US" sz="2100" dirty="0" smtClean="0">
-              <a:solidFill>
-                <a:schemeClr val="bg1"/>
-              </a:solidFill>
-            </a:endParaRPr>
           </a:p>
           <a:p>
             <a:pPr lvl="1"/>
@@ -3475,11 +3462,6 @@
               </a:rPr>
               <a:t>Invulnerability (Blue Shield)</a:t>
             </a:r>
-            <a:endParaRPr lang="en-US" sz="2100" dirty="0" smtClean="0">
-              <a:solidFill>
-                <a:schemeClr val="bg1"/>
-              </a:solidFill>
-            </a:endParaRPr>
           </a:p>
         </p:txBody>
       </p:sp>

</xml_diff>